<commit_message>
Removed some unused assets.
</commit_message>
<xml_diff>
--- a/Unity OpenXR Base/Assets/Images/Icons/Icon.pptx
+++ b/Unity OpenXR Base/Assets/Images/Icons/Icon.pptx
@@ -104,6 +104,11 @@
       </a:defRPr>
     </a:lvl9pPr>
   </p:defaultTextStyle>
+  <p:extLst>
+    <p:ext uri="{EFAFB233-063F-42B5-8137-9DF3F51BA10A}">
+      <p15:sldGuideLst xmlns:p15="http://schemas.microsoft.com/office/powerpoint/2012/main"/>
+    </p:ext>
+  </p:extLst>
 </p:presentation>
 </file>
 
@@ -256,7 +261,7 @@
           <a:p>
             <a:fld id="{83DBF81E-7D8A-44D1-8AF0-898F938A4EAA}" type="datetimeFigureOut">
               <a:rPr lang="en-NZ" smtClean="0"/>
-              <a:t>9/09/2021</a:t>
+              <a:t>10/09/2021</a:t>
             </a:fld>
             <a:endParaRPr lang="en-NZ"/>
           </a:p>
@@ -456,7 +461,7 @@
           <a:p>
             <a:fld id="{83DBF81E-7D8A-44D1-8AF0-898F938A4EAA}" type="datetimeFigureOut">
               <a:rPr lang="en-NZ" smtClean="0"/>
-              <a:t>9/09/2021</a:t>
+              <a:t>10/09/2021</a:t>
             </a:fld>
             <a:endParaRPr lang="en-NZ"/>
           </a:p>
@@ -666,7 +671,7 @@
           <a:p>
             <a:fld id="{83DBF81E-7D8A-44D1-8AF0-898F938A4EAA}" type="datetimeFigureOut">
               <a:rPr lang="en-NZ" smtClean="0"/>
-              <a:t>9/09/2021</a:t>
+              <a:t>10/09/2021</a:t>
             </a:fld>
             <a:endParaRPr lang="en-NZ"/>
           </a:p>
@@ -866,7 +871,7 @@
           <a:p>
             <a:fld id="{83DBF81E-7D8A-44D1-8AF0-898F938A4EAA}" type="datetimeFigureOut">
               <a:rPr lang="en-NZ" smtClean="0"/>
-              <a:t>9/09/2021</a:t>
+              <a:t>10/09/2021</a:t>
             </a:fld>
             <a:endParaRPr lang="en-NZ"/>
           </a:p>
@@ -1142,7 +1147,7 @@
           <a:p>
             <a:fld id="{83DBF81E-7D8A-44D1-8AF0-898F938A4EAA}" type="datetimeFigureOut">
               <a:rPr lang="en-NZ" smtClean="0"/>
-              <a:t>9/09/2021</a:t>
+              <a:t>10/09/2021</a:t>
             </a:fld>
             <a:endParaRPr lang="en-NZ"/>
           </a:p>
@@ -1410,7 +1415,7 @@
           <a:p>
             <a:fld id="{83DBF81E-7D8A-44D1-8AF0-898F938A4EAA}" type="datetimeFigureOut">
               <a:rPr lang="en-NZ" smtClean="0"/>
-              <a:t>9/09/2021</a:t>
+              <a:t>10/09/2021</a:t>
             </a:fld>
             <a:endParaRPr lang="en-NZ"/>
           </a:p>
@@ -1825,7 +1830,7 @@
           <a:p>
             <a:fld id="{83DBF81E-7D8A-44D1-8AF0-898F938A4EAA}" type="datetimeFigureOut">
               <a:rPr lang="en-NZ" smtClean="0"/>
-              <a:t>9/09/2021</a:t>
+              <a:t>10/09/2021</a:t>
             </a:fld>
             <a:endParaRPr lang="en-NZ"/>
           </a:p>
@@ -1967,7 +1972,7 @@
           <a:p>
             <a:fld id="{83DBF81E-7D8A-44D1-8AF0-898F938A4EAA}" type="datetimeFigureOut">
               <a:rPr lang="en-NZ" smtClean="0"/>
-              <a:t>9/09/2021</a:t>
+              <a:t>10/09/2021</a:t>
             </a:fld>
             <a:endParaRPr lang="en-NZ"/>
           </a:p>
@@ -2080,7 +2085,7 @@
           <a:p>
             <a:fld id="{83DBF81E-7D8A-44D1-8AF0-898F938A4EAA}" type="datetimeFigureOut">
               <a:rPr lang="en-NZ" smtClean="0"/>
-              <a:t>9/09/2021</a:t>
+              <a:t>10/09/2021</a:t>
             </a:fld>
             <a:endParaRPr lang="en-NZ"/>
           </a:p>
@@ -2393,7 +2398,7 @@
           <a:p>
             <a:fld id="{83DBF81E-7D8A-44D1-8AF0-898F938A4EAA}" type="datetimeFigureOut">
               <a:rPr lang="en-NZ" smtClean="0"/>
-              <a:t>9/09/2021</a:t>
+              <a:t>10/09/2021</a:t>
             </a:fld>
             <a:endParaRPr lang="en-NZ"/>
           </a:p>
@@ -2682,7 +2687,7 @@
           <a:p>
             <a:fld id="{83DBF81E-7D8A-44D1-8AF0-898F938A4EAA}" type="datetimeFigureOut">
               <a:rPr lang="en-NZ" smtClean="0"/>
-              <a:t>9/09/2021</a:t>
+              <a:t>10/09/2021</a:t>
             </a:fld>
             <a:endParaRPr lang="en-NZ"/>
           </a:p>
@@ -2925,7 +2930,7 @@
           <a:p>
             <a:fld id="{83DBF81E-7D8A-44D1-8AF0-898F938A4EAA}" type="datetimeFigureOut">
               <a:rPr lang="en-NZ" smtClean="0"/>
-              <a:t>9/09/2021</a:t>
+              <a:t>10/09/2021</a:t>
             </a:fld>
             <a:endParaRPr lang="en-NZ"/>
           </a:p>
@@ -3357,7 +3362,7 @@
         <p:spPr>
           <a:xfrm>
             <a:off x="3290123" y="885524"/>
-            <a:ext cx="5400000" cy="5400000"/>
+            <a:ext cx="7200000" cy="7200000"/>
           </a:xfrm>
           <a:prstGeom prst="rect">
             <a:avLst/>
@@ -3396,231 +3401,85 @@
           </a:p>
         </p:txBody>
       </p:sp>
-      <p:grpSp>
-        <p:nvGrpSpPr>
-          <p:cNvPr id="8" name="Group 7">
-            <a:extLst>
-              <a:ext uri="{FF2B5EF4-FFF2-40B4-BE49-F238E27FC236}">
-                <a16:creationId xmlns:a16="http://schemas.microsoft.com/office/drawing/2014/main" id="{27F26FE2-29F5-48D5-BB81-46A9E3E82843}"/>
-              </a:ext>
-            </a:extLst>
-          </p:cNvPr>
-          <p:cNvGrpSpPr/>
+      <p:pic>
+        <p:nvPicPr>
+          <p:cNvPr id="1026" name="Picture 2">
+            <a:extLst>
+              <a:ext uri="{FF2B5EF4-FFF2-40B4-BE49-F238E27FC236}">
+                <a16:creationId xmlns:a16="http://schemas.microsoft.com/office/drawing/2014/main" id="{BD1C1ACF-2393-473C-A46C-7123A5775564}"/>
+              </a:ext>
+            </a:extLst>
+          </p:cNvPr>
+          <p:cNvPicPr>
+            <a:picLocks noChangeAspect="1" noChangeArrowheads="1"/>
+          </p:cNvPicPr>
           <p:nvPr/>
-        </p:nvGrpSpPr>
-        <p:grpSpPr>
+        </p:nvPicPr>
+        <p:blipFill>
+          <a:blip r:embed="rId2">
+            <a:extLst>
+              <a:ext uri="{28A0092B-C50C-407E-A947-70E740481C1C}">
+                <a14:useLocalDpi xmlns:a14="http://schemas.microsoft.com/office/drawing/2010/main" val="0"/>
+              </a:ext>
+            </a:extLst>
+          </a:blip>
+          <a:srcRect/>
+          <a:stretch>
+            <a:fillRect/>
+          </a:stretch>
+        </p:blipFill>
+        <p:spPr bwMode="auto">
           <a:xfrm>
-            <a:off x="3542272" y="1700792"/>
-            <a:ext cx="4895702" cy="3769463"/>
-            <a:chOff x="3600023" y="2219121"/>
-            <a:chExt cx="4895702" cy="3769463"/>
+            <a:off x="3650123" y="1471856"/>
+            <a:ext cx="6480000" cy="1906875"/>
           </a:xfrm>
-        </p:grpSpPr>
-        <p:pic>
-          <p:nvPicPr>
-            <p:cNvPr id="1026" name="Picture 2">
-              <a:extLst>
-                <a:ext uri="{FF2B5EF4-FFF2-40B4-BE49-F238E27FC236}">
-                  <a16:creationId xmlns:a16="http://schemas.microsoft.com/office/drawing/2014/main" id="{BD1C1ACF-2393-473C-A46C-7123A5775564}"/>
-                </a:ext>
-              </a:extLst>
-            </p:cNvPr>
-            <p:cNvPicPr>
-              <a:picLocks noChangeAspect="1" noChangeArrowheads="1"/>
-            </p:cNvPicPr>
-            <p:nvPr/>
-          </p:nvPicPr>
-          <p:blipFill>
-            <a:blip r:embed="rId2">
-              <a:extLst>
-                <a:ext uri="{28A0092B-C50C-407E-A947-70E740481C1C}">
-                  <a14:useLocalDpi xmlns:a14="http://schemas.microsoft.com/office/drawing/2010/main" val="0"/>
-                </a:ext>
-              </a:extLst>
-            </a:blip>
-            <a:srcRect/>
-            <a:stretch>
-              <a:fillRect/>
-            </a:stretch>
-          </p:blipFill>
-          <p:spPr bwMode="auto">
-            <a:xfrm>
-              <a:off x="3699790" y="2219121"/>
-              <a:ext cx="4795935" cy="1411304"/>
-            </a:xfrm>
-            <a:prstGeom prst="rect">
-              <a:avLst/>
-            </a:prstGeom>
-            <a:noFill/>
-            <a:extLst>
-              <a:ext uri="{909E8E84-426E-40DD-AFC4-6F175D3DCCD1}">
-                <a14:hiddenFill xmlns:a14="http://schemas.microsoft.com/office/drawing/2010/main">
-                  <a:solidFill>
-                    <a:srgbClr val="FFFFFF"/>
-                  </a:solidFill>
-                </a14:hiddenFill>
-              </a:ext>
-            </a:extLst>
-          </p:spPr>
-        </p:pic>
-        <p:sp>
-          <p:nvSpPr>
-            <p:cNvPr id="4" name="Rectangle 3">
-              <a:extLst>
-                <a:ext uri="{FF2B5EF4-FFF2-40B4-BE49-F238E27FC236}">
-                  <a16:creationId xmlns:a16="http://schemas.microsoft.com/office/drawing/2014/main" id="{2D4E6F8D-42DC-47FE-8F37-27FAF4D44B24}"/>
-                </a:ext>
-              </a:extLst>
-            </p:cNvPr>
-            <p:cNvSpPr/>
-            <p:nvPr/>
-          </p:nvSpPr>
-          <p:spPr>
-            <a:xfrm>
-              <a:off x="3600023" y="3243767"/>
-              <a:ext cx="4745210" cy="1708160"/>
-            </a:xfrm>
-            <a:prstGeom prst="rect">
-              <a:avLst/>
-            </a:prstGeom>
-            <a:noFill/>
-            <a:effectLst/>
-          </p:spPr>
-          <p:txBody>
-            <a:bodyPr wrap="none" lIns="91440" tIns="45720" rIns="91440" bIns="45720">
-              <a:spAutoFit/>
-            </a:bodyPr>
-            <a:lstStyle/>
-            <a:p>
-              <a:pPr algn="ctr"/>
-              <a:r>
-                <a:rPr lang="en-US" sz="10500" b="1" dirty="0">
-                  <a:ln w="0">
-                    <a:solidFill>
-                      <a:srgbClr val="782D8E"/>
-                    </a:solidFill>
-                  </a:ln>
-                  <a:solidFill>
-                    <a:srgbClr val="782D8E"/>
-                  </a:solidFill>
-                  <a:effectLst>
-                    <a:outerShdw blurRad="38100" dist="25400" dir="5400000" algn="ctr" rotWithShape="0">
-                      <a:srgbClr val="6E747A">
-                        <a:alpha val="43000"/>
-                      </a:srgbClr>
-                    </a:outerShdw>
-                  </a:effectLst>
-                </a:rPr>
-                <a:t>UX base</a:t>
-              </a:r>
-            </a:p>
-          </p:txBody>
-        </p:sp>
-        <p:sp>
-          <p:nvSpPr>
-            <p:cNvPr id="5" name="Rectangle 4">
-              <a:extLst>
-                <a:ext uri="{FF2B5EF4-FFF2-40B4-BE49-F238E27FC236}">
-                  <a16:creationId xmlns:a16="http://schemas.microsoft.com/office/drawing/2014/main" id="{0AA4260F-BC4E-4064-B209-A15CF647EE28}"/>
-                </a:ext>
-              </a:extLst>
-            </p:cNvPr>
-            <p:cNvSpPr/>
-            <p:nvPr/>
-          </p:nvSpPr>
-          <p:spPr>
-            <a:xfrm>
-              <a:off x="4660385" y="4065363"/>
-              <a:ext cx="760396" cy="59747"/>
-            </a:xfrm>
-            <a:prstGeom prst="rect">
-              <a:avLst/>
-            </a:prstGeom>
-            <a:solidFill>
-              <a:schemeClr val="tx1"/>
-            </a:solidFill>
-            <a:ln>
-              <a:solidFill>
-                <a:schemeClr val="tx1"/>
-              </a:solidFill>
-            </a:ln>
-          </p:spPr>
-          <p:style>
-            <a:lnRef idx="2">
-              <a:schemeClr val="accent1">
-                <a:shade val="50000"/>
-              </a:schemeClr>
-            </a:lnRef>
-            <a:fillRef idx="1">
-              <a:schemeClr val="accent1"/>
-            </a:fillRef>
-            <a:effectRef idx="0">
-              <a:schemeClr val="accent1"/>
-            </a:effectRef>
-            <a:fontRef idx="minor">
-              <a:schemeClr val="lt1"/>
-            </a:fontRef>
-          </p:style>
-          <p:txBody>
-            <a:bodyPr rtlCol="0" anchor="ctr"/>
-            <a:lstStyle/>
-            <a:p>
-              <a:pPr algn="ctr"/>
-              <a:endParaRPr lang="en-NZ"/>
-            </a:p>
-          </p:txBody>
-        </p:sp>
-        <p:sp>
-          <p:nvSpPr>
-            <p:cNvPr id="9" name="Rectangle 8">
-              <a:extLst>
-                <a:ext uri="{FF2B5EF4-FFF2-40B4-BE49-F238E27FC236}">
-                  <a16:creationId xmlns:a16="http://schemas.microsoft.com/office/drawing/2014/main" id="{5B05801D-6B28-4171-A9E2-6BDE5890A537}"/>
-                </a:ext>
-              </a:extLst>
-            </p:cNvPr>
-            <p:cNvSpPr/>
-            <p:nvPr/>
-          </p:nvSpPr>
-          <p:spPr>
-            <a:xfrm>
-              <a:off x="3775513" y="4511256"/>
-              <a:ext cx="4429226" cy="1477328"/>
-            </a:xfrm>
-            <a:prstGeom prst="rect">
-              <a:avLst/>
-            </a:prstGeom>
-            <a:noFill/>
-            <a:effectLst/>
-          </p:spPr>
-          <p:txBody>
-            <a:bodyPr wrap="none" lIns="91440" tIns="45720" rIns="91440" bIns="45720">
-              <a:spAutoFit/>
-            </a:bodyPr>
-            <a:lstStyle/>
-            <a:p>
-              <a:pPr algn="ctr"/>
-              <a:r>
-                <a:rPr lang="en-US" sz="5400" dirty="0" err="1">
-                  <a:ln w="0">
-                    <a:solidFill>
-                      <a:srgbClr val="782D8E"/>
-                    </a:solidFill>
-                  </a:ln>
-                  <a:solidFill>
-                    <a:srgbClr val="782D8E"/>
-                  </a:solidFill>
-                  <a:effectLst>
-                    <a:outerShdw blurRad="38100" dist="25400" dir="5400000" algn="ctr" rotWithShape="0">
-                      <a:srgbClr val="6E747A">
-                        <a:alpha val="43000"/>
-                      </a:srgbClr>
-                    </a:outerShdw>
-                  </a:effectLst>
-                </a:rPr>
-                <a:t>smartdigitallab</a:t>
-              </a:r>
-              <a:endParaRPr lang="en-US" sz="5400" dirty="0">
+          <a:prstGeom prst="rect">
+            <a:avLst/>
+          </a:prstGeom>
+          <a:noFill/>
+          <a:extLst>
+            <a:ext uri="{909E8E84-426E-40DD-AFC4-6F175D3DCCD1}">
+              <a14:hiddenFill xmlns:a14="http://schemas.microsoft.com/office/drawing/2010/main">
+                <a:solidFill>
+                  <a:srgbClr val="FFFFFF"/>
+                </a:solidFill>
+              </a14:hiddenFill>
+            </a:ext>
+          </a:extLst>
+        </p:spPr>
+      </p:pic>
+      <p:sp>
+        <p:nvSpPr>
+          <p:cNvPr id="4" name="Rectangle 3">
+            <a:extLst>
+              <a:ext uri="{FF2B5EF4-FFF2-40B4-BE49-F238E27FC236}">
+                <a16:creationId xmlns:a16="http://schemas.microsoft.com/office/drawing/2014/main" id="{2D4E6F8D-42DC-47FE-8F37-27FAF4D44B24}"/>
+              </a:ext>
+            </a:extLst>
+          </p:cNvPr>
+          <p:cNvSpPr/>
+          <p:nvPr/>
+        </p:nvSpPr>
+        <p:spPr>
+          <a:xfrm>
+            <a:off x="4136149" y="3439083"/>
+            <a:ext cx="5790368" cy="2092881"/>
+          </a:xfrm>
+          <a:prstGeom prst="rect">
+            <a:avLst/>
+          </a:prstGeom>
+          <a:noFill/>
+          <a:effectLst/>
+        </p:spPr>
+        <p:txBody>
+          <a:bodyPr wrap="none" lIns="91440" tIns="45720" rIns="91440" bIns="45720">
+            <a:spAutoFit/>
+          </a:bodyPr>
+          <a:lstStyle/>
+          <a:p>
+            <a:pPr algn="ctr"/>
+            <a:r>
+              <a:rPr lang="en-US" sz="13000" b="1" dirty="0">
                 <a:ln w="0">
                   <a:solidFill>
                     <a:srgbClr val="782D8E"/>
@@ -3636,34 +3495,159 @@
                     </a:srgbClr>
                   </a:outerShdw>
                 </a:effectLst>
-              </a:endParaRPr>
-            </a:p>
-            <a:p>
-              <a:pPr algn="ctr"/>
-              <a:r>
-                <a:rPr lang="en-US" sz="3600" dirty="0">
-                  <a:ln w="0">
-                    <a:solidFill>
-                      <a:srgbClr val="782D8E"/>
-                    </a:solidFill>
-                  </a:ln>
+              </a:rPr>
+              <a:t>UX base</a:t>
+            </a:r>
+          </a:p>
+        </p:txBody>
+      </p:sp>
+      <p:sp>
+        <p:nvSpPr>
+          <p:cNvPr id="5" name="Rectangle 4">
+            <a:extLst>
+              <a:ext uri="{FF2B5EF4-FFF2-40B4-BE49-F238E27FC236}">
+                <a16:creationId xmlns:a16="http://schemas.microsoft.com/office/drawing/2014/main" id="{0AA4260F-BC4E-4064-B209-A15CF647EE28}"/>
+              </a:ext>
+            </a:extLst>
+          </p:cNvPr>
+          <p:cNvSpPr/>
+          <p:nvPr/>
+        </p:nvSpPr>
+        <p:spPr>
+          <a:xfrm>
+            <a:off x="5424755" y="4442290"/>
+            <a:ext cx="760396" cy="68400"/>
+          </a:xfrm>
+          <a:prstGeom prst="rect">
+            <a:avLst/>
+          </a:prstGeom>
+          <a:solidFill>
+            <a:schemeClr val="tx1"/>
+          </a:solidFill>
+          <a:ln>
+            <a:solidFill>
+              <a:schemeClr val="tx1"/>
+            </a:solidFill>
+          </a:ln>
+        </p:spPr>
+        <p:style>
+          <a:lnRef idx="2">
+            <a:schemeClr val="accent1">
+              <a:shade val="50000"/>
+            </a:schemeClr>
+          </a:lnRef>
+          <a:fillRef idx="1">
+            <a:schemeClr val="accent1"/>
+          </a:fillRef>
+          <a:effectRef idx="0">
+            <a:schemeClr val="accent1"/>
+          </a:effectRef>
+          <a:fontRef idx="minor">
+            <a:schemeClr val="lt1"/>
+          </a:fontRef>
+        </p:style>
+        <p:txBody>
+          <a:bodyPr rtlCol="0" anchor="ctr"/>
+          <a:lstStyle/>
+          <a:p>
+            <a:pPr algn="ctr"/>
+            <a:endParaRPr lang="en-NZ"/>
+          </a:p>
+        </p:txBody>
+      </p:sp>
+      <p:sp>
+        <p:nvSpPr>
+          <p:cNvPr id="9" name="Rectangle 8">
+            <a:extLst>
+              <a:ext uri="{FF2B5EF4-FFF2-40B4-BE49-F238E27FC236}">
+                <a16:creationId xmlns:a16="http://schemas.microsoft.com/office/drawing/2014/main" id="{5B05801D-6B28-4171-A9E2-6BDE5890A537}"/>
+              </a:ext>
+            </a:extLst>
+          </p:cNvPr>
+          <p:cNvSpPr/>
+          <p:nvPr/>
+        </p:nvSpPr>
+        <p:spPr>
+          <a:xfrm>
+            <a:off x="4137207" y="5592316"/>
+            <a:ext cx="5788252" cy="1908215"/>
+          </a:xfrm>
+          <a:prstGeom prst="rect">
+            <a:avLst/>
+          </a:prstGeom>
+          <a:noFill/>
+          <a:effectLst/>
+        </p:spPr>
+        <p:txBody>
+          <a:bodyPr wrap="none" lIns="91440" tIns="45720" rIns="91440" bIns="45720">
+            <a:spAutoFit/>
+          </a:bodyPr>
+          <a:lstStyle/>
+          <a:p>
+            <a:pPr algn="ctr"/>
+            <a:r>
+              <a:rPr lang="en-US" sz="7000" dirty="0" err="1">
+                <a:ln w="0">
                   <a:solidFill>
                     <a:srgbClr val="782D8E"/>
                   </a:solidFill>
-                  <a:effectLst>
-                    <a:outerShdw blurRad="38100" dist="25400" dir="5400000" algn="ctr" rotWithShape="0">
-                      <a:srgbClr val="6E747A">
-                        <a:alpha val="43000"/>
-                      </a:srgbClr>
-                    </a:outerShdw>
-                  </a:effectLst>
-                </a:rPr>
-                <a:t>University of Auckland</a:t>
-              </a:r>
-            </a:p>
-          </p:txBody>
-        </p:sp>
-      </p:grpSp>
+                </a:ln>
+                <a:solidFill>
+                  <a:srgbClr val="782D8E"/>
+                </a:solidFill>
+                <a:effectLst>
+                  <a:outerShdw blurRad="38100" dist="25400" dir="5400000" algn="ctr" rotWithShape="0">
+                    <a:srgbClr val="6E747A">
+                      <a:alpha val="43000"/>
+                    </a:srgbClr>
+                  </a:outerShdw>
+                </a:effectLst>
+              </a:rPr>
+              <a:t>smartdigitallab</a:t>
+            </a:r>
+            <a:endParaRPr lang="en-US" sz="7000" dirty="0">
+              <a:ln w="0">
+                <a:solidFill>
+                  <a:srgbClr val="782D8E"/>
+                </a:solidFill>
+              </a:ln>
+              <a:solidFill>
+                <a:srgbClr val="782D8E"/>
+              </a:solidFill>
+              <a:effectLst>
+                <a:outerShdw blurRad="38100" dist="25400" dir="5400000" algn="ctr" rotWithShape="0">
+                  <a:srgbClr val="6E747A">
+                    <a:alpha val="43000"/>
+                  </a:srgbClr>
+                </a:outerShdw>
+              </a:effectLst>
+            </a:endParaRPr>
+          </a:p>
+          <a:p>
+            <a:pPr algn="ctr"/>
+            <a:r>
+              <a:rPr lang="en-US" sz="4700" dirty="0">
+                <a:ln w="0">
+                  <a:solidFill>
+                    <a:srgbClr val="782D8E"/>
+                  </a:solidFill>
+                </a:ln>
+                <a:solidFill>
+                  <a:srgbClr val="782D8E"/>
+                </a:solidFill>
+                <a:effectLst>
+                  <a:outerShdw blurRad="38100" dist="25400" dir="5400000" algn="ctr" rotWithShape="0">
+                    <a:srgbClr val="6E747A">
+                      <a:alpha val="43000"/>
+                    </a:srgbClr>
+                  </a:outerShdw>
+                </a:effectLst>
+              </a:rPr>
+              <a:t>University of Auckland</a:t>
+            </a:r>
+          </a:p>
+        </p:txBody>
+      </p:sp>
     </p:spTree>
     <p:extLst>
       <p:ext uri="{BB962C8B-B14F-4D97-AF65-F5344CB8AC3E}">

</xml_diff>